<commit_message>
mais funcoes escopo melhor definido
</commit_message>
<xml_diff>
--- a/Novo(a) Apresentação do Microsoft PowerPoint.pptx
+++ b/Novo(a) Apresentação do Microsoft PowerPoint.pptx
@@ -105,13 +105,18 @@
       </a:defRPr>
     </a:lvl9pPr>
   </p:defaultTextStyle>
+  <p:extLst>
+    <p:ext uri="{EFAFB233-063F-42B5-8137-9DF3F51BA10A}">
+      <p15:sldGuideLst xmlns:p15="http://schemas.microsoft.com/office/powerpoint/2012/main"/>
+    </p:ext>
+  </p:extLst>
 </p:presentation>
 </file>
 
 <file path=ppt/revisionInfo.xml><?xml version="1.0" encoding="utf-8"?>
 <p1510:revInfo xmlns:a="http://schemas.openxmlformats.org/drawingml/2006/main" xmlns:r="http://schemas.openxmlformats.org/officeDocument/2006/relationships" xmlns:p1510="http://schemas.microsoft.com/office/powerpoint/2015/10/main">
   <p1510:revLst>
-    <p1510:client id="{AD77C08A-F24E-4D37-A048-BEDF670EEB3C}" v="15" dt="2020-04-11T17:23:38.369"/>
+    <p1510:client id="{AD77C08A-F24E-4D37-A048-BEDF670EEB3C}" v="166" dt="2020-05-01T15:50:57.866"/>
   </p1510:revLst>
 </p1510:revInfo>
 </file>
@@ -120,13 +125,13 @@
 <pc:chgInfo xmlns:a="http://schemas.openxmlformats.org/drawingml/2006/main" xmlns:r="http://schemas.openxmlformats.org/officeDocument/2006/relationships" xmlns:ac="http://schemas.microsoft.com/office/drawing/2013/main/command" xmlns:pc="http://schemas.microsoft.com/office/powerpoint/2013/main/command">
   <pc:docChgLst>
     <pc:chgData name="Giovanni Augusto Rozatti" userId="8b509b85-f4be-466a-bb82-49aa8c1522e4" providerId="ADAL" clId="{AD77C08A-F24E-4D37-A048-BEDF670EEB3C}"/>
-    <pc:docChg chg="undo custSel addSld modSld">
-      <pc:chgData name="Giovanni Augusto Rozatti" userId="8b509b85-f4be-466a-bb82-49aa8c1522e4" providerId="ADAL" clId="{AD77C08A-F24E-4D37-A048-BEDF670EEB3C}" dt="2020-04-11T17:46:40.504" v="196" actId="478"/>
+    <pc:docChg chg="undo custSel mod addSld modSld">
+      <pc:chgData name="Giovanni Augusto Rozatti" userId="8b509b85-f4be-466a-bb82-49aa8c1522e4" providerId="ADAL" clId="{AD77C08A-F24E-4D37-A048-BEDF670EEB3C}" dt="2020-05-01T16:39:03.077" v="398" actId="1076"/>
       <pc:docMkLst>
         <pc:docMk/>
       </pc:docMkLst>
       <pc:sldChg chg="addSp delSp modSp add">
-        <pc:chgData name="Giovanni Augusto Rozatti" userId="8b509b85-f4be-466a-bb82-49aa8c1522e4" providerId="ADAL" clId="{AD77C08A-F24E-4D37-A048-BEDF670EEB3C}" dt="2020-04-10T18:51:28.122" v="183" actId="1076"/>
+        <pc:chgData name="Giovanni Augusto Rozatti" userId="8b509b85-f4be-466a-bb82-49aa8c1522e4" providerId="ADAL" clId="{AD77C08A-F24E-4D37-A048-BEDF670EEB3C}" dt="2020-05-01T16:39:03.077" v="398" actId="1076"/>
         <pc:sldMkLst>
           <pc:docMk/>
           <pc:sldMk cId="2136244634" sldId="256"/>
@@ -139,12 +144,28 @@
             <ac:spMk id="2" creationId="{21D599B7-E4E7-4A5E-A880-1F886CD9294A}"/>
           </ac:spMkLst>
         </pc:spChg>
+        <pc:spChg chg="add del mod">
+          <ac:chgData name="Giovanni Augusto Rozatti" userId="8b509b85-f4be-466a-bb82-49aa8c1522e4" providerId="ADAL" clId="{AD77C08A-F24E-4D37-A048-BEDF670EEB3C}" dt="2020-05-01T15:51:16.919" v="397" actId="478"/>
+          <ac:spMkLst>
+            <pc:docMk/>
+            <pc:sldMk cId="2136244634" sldId="256"/>
+            <ac:spMk id="2" creationId="{F350A040-09D2-4EF6-9B01-F9C121203A10}"/>
+          </ac:spMkLst>
+        </pc:spChg>
         <pc:spChg chg="del">
           <ac:chgData name="Giovanni Augusto Rozatti" userId="8b509b85-f4be-466a-bb82-49aa8c1522e4" providerId="ADAL" clId="{AD77C08A-F24E-4D37-A048-BEDF670EEB3C}" dt="2020-04-10T17:39:13.104" v="1" actId="478"/>
           <ac:spMkLst>
             <pc:docMk/>
             <pc:sldMk cId="2136244634" sldId="256"/>
             <ac:spMk id="3" creationId="{2D7DD5D5-E1D1-4404-AD0D-76D1A801585E}"/>
+          </ac:spMkLst>
+        </pc:spChg>
+        <pc:spChg chg="add mod">
+          <ac:chgData name="Giovanni Augusto Rozatti" userId="8b509b85-f4be-466a-bb82-49aa8c1522e4" providerId="ADAL" clId="{AD77C08A-F24E-4D37-A048-BEDF670EEB3C}" dt="2020-05-01T16:39:03.077" v="398" actId="1076"/>
+          <ac:spMkLst>
+            <pc:docMk/>
+            <pc:sldMk cId="2136244634" sldId="256"/>
+            <ac:spMk id="3" creationId="{BC986531-2F5E-4CBD-8653-C22744E1E9FD}"/>
           </ac:spMkLst>
         </pc:spChg>
         <pc:spChg chg="add mod">
@@ -180,8 +201,8 @@
           </ac:spMkLst>
         </pc:spChg>
       </pc:sldChg>
-      <pc:sldChg chg="addSp delSp modSp add">
-        <pc:chgData name="Giovanni Augusto Rozatti" userId="8b509b85-f4be-466a-bb82-49aa8c1522e4" providerId="ADAL" clId="{AD77C08A-F24E-4D37-A048-BEDF670EEB3C}" dt="2020-04-11T17:46:40.504" v="196" actId="478"/>
+      <pc:sldChg chg="addSp delSp modSp add mod setBg">
+        <pc:chgData name="Giovanni Augusto Rozatti" userId="8b509b85-f4be-466a-bb82-49aa8c1522e4" providerId="ADAL" clId="{AD77C08A-F24E-4D37-A048-BEDF670EEB3C}" dt="2020-04-30T16:21:01.048" v="350" actId="26606"/>
         <pc:sldMkLst>
           <pc:docMk/>
           <pc:sldMk cId="871085652" sldId="257"/>
@@ -202,6 +223,22 @@
             <ac:spMk id="3" creationId="{C2745F70-765C-45A7-8FF7-25E7A510B609}"/>
           </ac:spMkLst>
         </pc:spChg>
+        <pc:picChg chg="add mod">
+          <ac:chgData name="Giovanni Augusto Rozatti" userId="8b509b85-f4be-466a-bb82-49aa8c1522e4" providerId="ADAL" clId="{AD77C08A-F24E-4D37-A048-BEDF670EEB3C}" dt="2020-04-30T16:21:01.048" v="350" actId="26606"/>
+          <ac:picMkLst>
+            <pc:docMk/>
+            <pc:sldMk cId="871085652" sldId="257"/>
+            <ac:picMk id="2" creationId="{50FF7638-5574-4983-9601-A10A0FCF92DB}"/>
+          </ac:picMkLst>
+        </pc:picChg>
+        <pc:picChg chg="add mod">
+          <ac:chgData name="Giovanni Augusto Rozatti" userId="8b509b85-f4be-466a-bb82-49aa8c1522e4" providerId="ADAL" clId="{AD77C08A-F24E-4D37-A048-BEDF670EEB3C}" dt="2020-04-30T16:21:01.048" v="350" actId="26606"/>
+          <ac:picMkLst>
+            <pc:docMk/>
+            <pc:sldMk cId="871085652" sldId="257"/>
+            <ac:picMk id="3" creationId="{065DAA68-3F19-47A6-AE1C-615122E5173C}"/>
+          </ac:picMkLst>
+        </pc:picChg>
         <pc:picChg chg="add del mod modCrop">
           <ac:chgData name="Giovanni Augusto Rozatti" userId="8b509b85-f4be-466a-bb82-49aa8c1522e4" providerId="ADAL" clId="{AD77C08A-F24E-4D37-A048-BEDF670EEB3C}" dt="2020-04-11T17:46:40.504" v="196" actId="478"/>
           <ac:picMkLst>
@@ -365,7 +402,7 @@
           <a:p>
             <a:fld id="{33BD2E8A-DA60-43A0-898D-F21E8CEE3037}" type="datetimeFigureOut">
               <a:rPr lang="en-US" smtClean="0"/>
-              <a:t>4/10/2020</a:t>
+              <a:t>5/1/2020</a:t>
             </a:fld>
             <a:endParaRPr lang="en-US"/>
           </a:p>
@@ -565,7 +602,7 @@
           <a:p>
             <a:fld id="{33BD2E8A-DA60-43A0-898D-F21E8CEE3037}" type="datetimeFigureOut">
               <a:rPr lang="en-US" smtClean="0"/>
-              <a:t>4/10/2020</a:t>
+              <a:t>5/1/2020</a:t>
             </a:fld>
             <a:endParaRPr lang="en-US"/>
           </a:p>
@@ -775,7 +812,7 @@
           <a:p>
             <a:fld id="{33BD2E8A-DA60-43A0-898D-F21E8CEE3037}" type="datetimeFigureOut">
               <a:rPr lang="en-US" smtClean="0"/>
-              <a:t>4/10/2020</a:t>
+              <a:t>5/1/2020</a:t>
             </a:fld>
             <a:endParaRPr lang="en-US"/>
           </a:p>
@@ -975,7 +1012,7 @@
           <a:p>
             <a:fld id="{33BD2E8A-DA60-43A0-898D-F21E8CEE3037}" type="datetimeFigureOut">
               <a:rPr lang="en-US" smtClean="0"/>
-              <a:t>4/10/2020</a:t>
+              <a:t>5/1/2020</a:t>
             </a:fld>
             <a:endParaRPr lang="en-US"/>
           </a:p>
@@ -1251,7 +1288,7 @@
           <a:p>
             <a:fld id="{33BD2E8A-DA60-43A0-898D-F21E8CEE3037}" type="datetimeFigureOut">
               <a:rPr lang="en-US" smtClean="0"/>
-              <a:t>4/10/2020</a:t>
+              <a:t>5/1/2020</a:t>
             </a:fld>
             <a:endParaRPr lang="en-US"/>
           </a:p>
@@ -1519,7 +1556,7 @@
           <a:p>
             <a:fld id="{33BD2E8A-DA60-43A0-898D-F21E8CEE3037}" type="datetimeFigureOut">
               <a:rPr lang="en-US" smtClean="0"/>
-              <a:t>4/10/2020</a:t>
+              <a:t>5/1/2020</a:t>
             </a:fld>
             <a:endParaRPr lang="en-US"/>
           </a:p>
@@ -1934,7 +1971,7 @@
           <a:p>
             <a:fld id="{33BD2E8A-DA60-43A0-898D-F21E8CEE3037}" type="datetimeFigureOut">
               <a:rPr lang="en-US" smtClean="0"/>
-              <a:t>4/10/2020</a:t>
+              <a:t>5/1/2020</a:t>
             </a:fld>
             <a:endParaRPr lang="en-US"/>
           </a:p>
@@ -2076,7 +2113,7 @@
           <a:p>
             <a:fld id="{33BD2E8A-DA60-43A0-898D-F21E8CEE3037}" type="datetimeFigureOut">
               <a:rPr lang="en-US" smtClean="0"/>
-              <a:t>4/10/2020</a:t>
+              <a:t>5/1/2020</a:t>
             </a:fld>
             <a:endParaRPr lang="en-US"/>
           </a:p>
@@ -2189,7 +2226,7 @@
           <a:p>
             <a:fld id="{33BD2E8A-DA60-43A0-898D-F21E8CEE3037}" type="datetimeFigureOut">
               <a:rPr lang="en-US" smtClean="0"/>
-              <a:t>4/10/2020</a:t>
+              <a:t>5/1/2020</a:t>
             </a:fld>
             <a:endParaRPr lang="en-US"/>
           </a:p>
@@ -2502,7 +2539,7 @@
           <a:p>
             <a:fld id="{33BD2E8A-DA60-43A0-898D-F21E8CEE3037}" type="datetimeFigureOut">
               <a:rPr lang="en-US" smtClean="0"/>
-              <a:t>4/10/2020</a:t>
+              <a:t>5/1/2020</a:t>
             </a:fld>
             <a:endParaRPr lang="en-US"/>
           </a:p>
@@ -2791,7 +2828,7 @@
           <a:p>
             <a:fld id="{33BD2E8A-DA60-43A0-898D-F21E8CEE3037}" type="datetimeFigureOut">
               <a:rPr lang="en-US" smtClean="0"/>
-              <a:t>4/10/2020</a:t>
+              <a:t>5/1/2020</a:t>
             </a:fld>
             <a:endParaRPr lang="en-US"/>
           </a:p>
@@ -3034,7 +3071,7 @@
           <a:p>
             <a:fld id="{33BD2E8A-DA60-43A0-898D-F21E8CEE3037}" type="datetimeFigureOut">
               <a:rPr lang="en-US" smtClean="0"/>
-              <a:t>4/10/2020</a:t>
+              <a:t>5/1/2020</a:t>
             </a:fld>
             <a:endParaRPr lang="en-US"/>
           </a:p>
@@ -3715,6 +3752,71 @@
           </a:p>
         </p:txBody>
       </p:sp>
+      <p:sp>
+        <p:nvSpPr>
+          <p:cNvPr id="3" name="Retângulo 2">
+            <a:extLst>
+              <a:ext uri="{FF2B5EF4-FFF2-40B4-BE49-F238E27FC236}">
+                <a16:creationId xmlns:a16="http://schemas.microsoft.com/office/drawing/2014/main" id="{BC986531-2F5E-4CBD-8653-C22744E1E9FD}"/>
+              </a:ext>
+            </a:extLst>
+          </p:cNvPr>
+          <p:cNvSpPr/>
+          <p:nvPr/>
+        </p:nvSpPr>
+        <p:spPr>
+          <a:xfrm>
+            <a:off x="459544" y="3621796"/>
+            <a:ext cx="5691879" cy="1200329"/>
+          </a:xfrm>
+          <a:prstGeom prst="rect">
+            <a:avLst/>
+          </a:prstGeom>
+        </p:spPr>
+        <p:txBody>
+          <a:bodyPr wrap="none">
+            <a:spAutoFit/>
+          </a:bodyPr>
+          <a:lstStyle/>
+          <a:p>
+            <a:r>
+              <a:rPr lang="en-US" dirty="0" err="1"/>
+              <a:t>Univesp</a:t>
+            </a:r>
+            <a:r>
+              <a:rPr lang="en-US" dirty="0"/>
+              <a:t>:</a:t>
+            </a:r>
+          </a:p>
+          <a:p>
+            <a:r>
+              <a:rPr lang="en-US" dirty="0">
+                <a:hlinkClick r:id="rId4"/>
+              </a:rPr>
+              <a:t>Volume: https://www.youtube.com/watch?v=wq98lREKi1c</a:t>
+            </a:r>
+            <a:endParaRPr lang="en-US" dirty="0"/>
+          </a:p>
+          <a:p>
+            <a:r>
+              <a:rPr lang="en-US" dirty="0" err="1">
+                <a:hlinkClick r:id="rId5"/>
+              </a:rPr>
+              <a:t>Área</a:t>
+            </a:r>
+            <a:r>
+              <a:rPr lang="en-US" dirty="0">
+                <a:hlinkClick r:id="rId5"/>
+              </a:rPr>
+              <a:t>: https://www.youtube.com/watch?v=KxQPF7YZ408</a:t>
+            </a:r>
+            <a:endParaRPr lang="en-US" dirty="0"/>
+          </a:p>
+          <a:p>
+            <a:endParaRPr lang="en-US" dirty="0"/>
+          </a:p>
+        </p:txBody>
+      </p:sp>
     </p:spTree>
     <p:extLst>
       <p:ext uri="{BB962C8B-B14F-4D97-AF65-F5344CB8AC3E}">
@@ -3731,6 +3833,14 @@
 <file path=ppt/slides/slide2.xml><?xml version="1.0" encoding="utf-8"?>
 <p:sld xmlns:a="http://schemas.openxmlformats.org/drawingml/2006/main" xmlns:r="http://schemas.openxmlformats.org/officeDocument/2006/relationships" xmlns:p="http://schemas.openxmlformats.org/presentationml/2006/main">
   <p:cSld>
+    <p:bg>
+      <p:bgPr>
+        <a:solidFill>
+          <a:schemeClr val="bg1"/>
+        </a:solidFill>
+        <a:effectLst/>
+      </p:bgPr>
+    </p:bg>
     <p:spTree>
       <p:nvGrpSpPr>
         <p:cNvPr id="1" name=""/>
@@ -3745,6 +3855,82 @@
           <a:chExt cx="0" cy="0"/>
         </a:xfrm>
       </p:grpSpPr>
+      <p:pic>
+        <p:nvPicPr>
+          <p:cNvPr id="2" name="Imagem 1">
+            <a:extLst>
+              <a:ext uri="{FF2B5EF4-FFF2-40B4-BE49-F238E27FC236}">
+                <a16:creationId xmlns:a16="http://schemas.microsoft.com/office/drawing/2014/main" id="{50FF7638-5574-4983-9601-A10A0FCF92DB}"/>
+              </a:ext>
+            </a:extLst>
+          </p:cNvPr>
+          <p:cNvPicPr>
+            <a:picLocks noChangeAspect="1"/>
+          </p:cNvPicPr>
+          <p:nvPr/>
+        </p:nvPicPr>
+        <p:blipFill rotWithShape="1">
+          <a:blip r:embed="rId2">
+            <a:extLst>
+              <a:ext uri="{BEBA8EAE-BF5A-486C-A8C5-ECC9F3942E4B}">
+                <a14:imgProps xmlns:a14="http://schemas.microsoft.com/office/drawing/2010/main">
+                  <a14:imgLayer r:embed="rId3">
+                    <a14:imgEffect>
+                      <a14:artisticPaintStrokes trans="80000"/>
+                    </a14:imgEffect>
+                    <a14:imgEffect>
+                      <a14:saturation sat="66000"/>
+                    </a14:imgEffect>
+                    <a14:imgEffect>
+                      <a14:brightnessContrast bright="-20000" contrast="40000"/>
+                    </a14:imgEffect>
+                  </a14:imgLayer>
+                </a14:imgProps>
+              </a:ext>
+            </a:extLst>
+          </a:blip>
+          <a:srcRect r="8958" b="3"/>
+          <a:stretch/>
+        </p:blipFill>
+        <p:spPr>
+          <a:xfrm>
+            <a:off x="643466" y="643467"/>
+            <a:ext cx="5372099" cy="5571066"/>
+          </a:xfrm>
+          <a:prstGeom prst="rect">
+            <a:avLst/>
+          </a:prstGeom>
+        </p:spPr>
+      </p:pic>
+      <p:pic>
+        <p:nvPicPr>
+          <p:cNvPr id="3" name="Imagem 2">
+            <a:extLst>
+              <a:ext uri="{FF2B5EF4-FFF2-40B4-BE49-F238E27FC236}">
+                <a16:creationId xmlns:a16="http://schemas.microsoft.com/office/drawing/2014/main" id="{065DAA68-3F19-47A6-AE1C-615122E5173C}"/>
+              </a:ext>
+            </a:extLst>
+          </p:cNvPr>
+          <p:cNvPicPr>
+            <a:picLocks noChangeAspect="1"/>
+          </p:cNvPicPr>
+          <p:nvPr/>
+        </p:nvPicPr>
+        <p:blipFill rotWithShape="1">
+          <a:blip r:embed="rId4"/>
+          <a:srcRect l="28160" r="1" b="1"/>
+          <a:stretch/>
+        </p:blipFill>
+        <p:spPr>
+          <a:xfrm>
+            <a:off x="6176433" y="643467"/>
+            <a:ext cx="5372099" cy="5571066"/>
+          </a:xfrm>
+          <a:prstGeom prst="rect">
+            <a:avLst/>
+          </a:prstGeom>
+        </p:spPr>
+      </p:pic>
     </p:spTree>
     <p:extLst>
       <p:ext uri="{BB962C8B-B14F-4D97-AF65-F5344CB8AC3E}">

</xml_diff>